<commit_message>
Fixes typos and formatting in shared_examples
Signed-off-by: Franklin Webber <franklin@chef.io>
</commit_message>
<xml_diff>
--- a/04-shared_examples.pptx
+++ b/04-shared_examples.pptx
@@ -839,11 +839,7 @@
             </a:r>
             <a:r>
               <a:rPr lang="en-US" smtClean="0"/>
-              <a:t>are </a:t>
-            </a:r>
-            <a:r>
-              <a:rPr lang="en-US" smtClean="0"/>
-              <a:t>going </a:t>
+              <a:t>are going </a:t>
             </a:r>
             <a:r>
               <a:rPr lang="en-US" dirty="0" smtClean="0"/>
@@ -982,15 +978,7 @@
           <a:p>
             <a:r>
               <a:rPr lang="en-US" dirty="0" smtClean="0"/>
-              <a:t>In this demonstration I will show you how to extract the package names into a let helper, create similar looking </a:t>
-            </a:r>
-            <a:r>
-              <a:rPr lang="en-US" dirty="0" smtClean="0"/>
-              <a:t>examples</a:t>
-            </a:r>
-            <a:r>
-              <a:rPr lang="en-US" dirty="0" smtClean="0"/>
-              <a:t>, and then extract those examples into a </a:t>
+              <a:t>In this demonstration I will show you how to extract the package names into a let helper, create similar looking examples, and then extract those examples into a </a:t>
             </a:r>
             <a:r>
               <a:rPr lang="en-US" dirty="0" err="1" smtClean="0"/>
@@ -3174,7 +3162,19 @@
           <a:p>
             <a:r>
               <a:rPr lang="en-US" dirty="0"/>
-              <a:t>Now it is time to demonstrate how let can be used to help create more </a:t>
+              <a:t>Now it is time to demonstrate how </a:t>
+            </a:r>
+            <a:r>
+              <a:rPr lang="en-US" dirty="0" err="1" smtClean="0"/>
+              <a:t>shared_exaples</a:t>
+            </a:r>
+            <a:r>
+              <a:rPr lang="en-US" smtClean="0"/>
+              <a:t> can </a:t>
+            </a:r>
+            <a:r>
+              <a:rPr lang="en-US" dirty="0"/>
+              <a:t>be used to help create more </a:t>
             </a:r>
             <a:r>
               <a:rPr lang="en-US" dirty="0" smtClean="0"/>
@@ -4102,14 +4102,14 @@
           </a:ln>
           <a:extLst>
             <a:ext uri="{909E8E84-426E-40dd-AFC4-6F175D3DCCD1}">
-              <a14:hiddenFill xmlns:a14="http://schemas.microsoft.com/office/drawing/2010/main" xmlns="">
+              <a14:hiddenFill xmlns="" xmlns:a14="http://schemas.microsoft.com/office/drawing/2010/main">
                 <a:solidFill>
                   <a:srgbClr val="FFFFFF"/>
                 </a:solidFill>
               </a14:hiddenFill>
             </a:ext>
             <a:ext uri="{91240B29-F687-4f45-9708-019B960494DF}">
-              <a14:hiddenLine xmlns:a14="http://schemas.microsoft.com/office/drawing/2010/main" xmlns="" w="9525">
+              <a14:hiddenLine xmlns="" xmlns:a14="http://schemas.microsoft.com/office/drawing/2010/main" w="9525">
                 <a:solidFill>
                   <a:srgbClr val="000000"/>
                 </a:solidFill>
@@ -4257,14 +4257,14 @@
           </a:ln>
           <a:extLst>
             <a:ext uri="{909E8E84-426E-40dd-AFC4-6F175D3DCCD1}">
-              <a14:hiddenFill xmlns:a14="http://schemas.microsoft.com/office/drawing/2010/main" xmlns="">
+              <a14:hiddenFill xmlns="" xmlns:a14="http://schemas.microsoft.com/office/drawing/2010/main">
                 <a:solidFill>
                   <a:srgbClr val="FFFFFF"/>
                 </a:solidFill>
               </a14:hiddenFill>
             </a:ext>
             <a:ext uri="{91240B29-F687-4f45-9708-019B960494DF}">
-              <a14:hiddenLine xmlns:a14="http://schemas.microsoft.com/office/drawing/2010/main" xmlns="" w="9525">
+              <a14:hiddenLine xmlns="" xmlns:a14="http://schemas.microsoft.com/office/drawing/2010/main" w="9525">
                 <a:solidFill>
                   <a:srgbClr val="000000"/>
                 </a:solidFill>
@@ -4755,14 +4755,14 @@
           </a:ln>
           <a:extLst>
             <a:ext uri="{909E8E84-426E-40dd-AFC4-6F175D3DCCD1}">
-              <a14:hiddenFill xmlns:a14="http://schemas.microsoft.com/office/drawing/2010/main" xmlns="">
+              <a14:hiddenFill xmlns="" xmlns:a14="http://schemas.microsoft.com/office/drawing/2010/main">
                 <a:solidFill>
                   <a:srgbClr val="FFFFFF"/>
                 </a:solidFill>
               </a14:hiddenFill>
             </a:ext>
             <a:ext uri="{91240B29-F687-4f45-9708-019B960494DF}">
-              <a14:hiddenLine xmlns:a14="http://schemas.microsoft.com/office/drawing/2010/main" xmlns="" w="9525">
+              <a14:hiddenLine xmlns="" xmlns:a14="http://schemas.microsoft.com/office/drawing/2010/main" w="9525">
                 <a:solidFill>
                   <a:srgbClr val="000000"/>
                 </a:solidFill>
@@ -7068,14 +7068,14 @@
           </a:ln>
           <a:extLst>
             <a:ext uri="{909E8E84-426E-40dd-AFC4-6F175D3DCCD1}">
-              <a14:hiddenFill xmlns:a14="http://schemas.microsoft.com/office/drawing/2010/main" xmlns="">
+              <a14:hiddenFill xmlns="" xmlns:a14="http://schemas.microsoft.com/office/drawing/2010/main">
                 <a:solidFill>
                   <a:srgbClr val="FFFFFF"/>
                 </a:solidFill>
               </a14:hiddenFill>
             </a:ext>
             <a:ext uri="{91240B29-F687-4f45-9708-019B960494DF}">
-              <a14:hiddenLine xmlns:a14="http://schemas.microsoft.com/office/drawing/2010/main" xmlns="" w="9525">
+              <a14:hiddenLine xmlns="" xmlns:a14="http://schemas.microsoft.com/office/drawing/2010/main" w="9525">
                 <a:solidFill>
                   <a:srgbClr val="000000"/>
                 </a:solidFill>
@@ -8683,14 +8683,14 @@
           </a:ln>
           <a:extLst>
             <a:ext uri="{909E8E84-426E-40dd-AFC4-6F175D3DCCD1}">
-              <a14:hiddenFill xmlns:a14="http://schemas.microsoft.com/office/drawing/2010/main" xmlns="">
+              <a14:hiddenFill xmlns="" xmlns:a14="http://schemas.microsoft.com/office/drawing/2010/main">
                 <a:solidFill>
                   <a:srgbClr val="FFFFFF"/>
                 </a:solidFill>
               </a14:hiddenFill>
             </a:ext>
             <a:ext uri="{91240B29-F687-4f45-9708-019B960494DF}">
-              <a14:hiddenLine xmlns:a14="http://schemas.microsoft.com/office/drawing/2010/main" xmlns="" w="9525">
+              <a14:hiddenLine xmlns="" xmlns:a14="http://schemas.microsoft.com/office/drawing/2010/main" w="9525">
                 <a:solidFill>
                   <a:srgbClr val="000000"/>
                 </a:solidFill>
@@ -9248,14 +9248,14 @@
           </a:ln>
           <a:extLst>
             <a:ext uri="{909E8E84-426E-40dd-AFC4-6F175D3DCCD1}">
-              <a14:hiddenFill xmlns:a14="http://schemas.microsoft.com/office/drawing/2010/main" xmlns="">
+              <a14:hiddenFill xmlns="" xmlns:a14="http://schemas.microsoft.com/office/drawing/2010/main">
                 <a:solidFill>
                   <a:srgbClr val="FFFFFF"/>
                 </a:solidFill>
               </a14:hiddenFill>
             </a:ext>
             <a:ext uri="{91240B29-F687-4f45-9708-019B960494DF}">
-              <a14:hiddenLine xmlns:a14="http://schemas.microsoft.com/office/drawing/2010/main" xmlns="" w="9525">
+              <a14:hiddenLine xmlns="" xmlns:a14="http://schemas.microsoft.com/office/drawing/2010/main" w="9525">
                 <a:solidFill>
                   <a:srgbClr val="000000"/>
                 </a:solidFill>
@@ -9822,14 +9822,14 @@
           </a:ln>
           <a:extLst>
             <a:ext uri="{909E8E84-426E-40dd-AFC4-6F175D3DCCD1}">
-              <a14:hiddenFill xmlns:a14="http://schemas.microsoft.com/office/drawing/2010/main" xmlns="">
+              <a14:hiddenFill xmlns="" xmlns:a14="http://schemas.microsoft.com/office/drawing/2010/main">
                 <a:solidFill>
                   <a:srgbClr val="FFFFFF"/>
                 </a:solidFill>
               </a14:hiddenFill>
             </a:ext>
             <a:ext uri="{91240B29-F687-4f45-9708-019B960494DF}">
-              <a14:hiddenLine xmlns:a14="http://schemas.microsoft.com/office/drawing/2010/main" xmlns="" w="9525">
+              <a14:hiddenLine xmlns="" xmlns:a14="http://schemas.microsoft.com/office/drawing/2010/main" w="9525">
                 <a:solidFill>
                   <a:srgbClr val="000000"/>
                 </a:solidFill>
@@ -10481,14 +10481,14 @@
           </a:ln>
           <a:extLst>
             <a:ext uri="{909E8E84-426E-40dd-AFC4-6F175D3DCCD1}">
-              <a14:hiddenFill xmlns:a14="http://schemas.microsoft.com/office/drawing/2010/main" xmlns="">
+              <a14:hiddenFill xmlns="" xmlns:a14="http://schemas.microsoft.com/office/drawing/2010/main">
                 <a:solidFill>
                   <a:srgbClr val="FFFFFF"/>
                 </a:solidFill>
               </a14:hiddenFill>
             </a:ext>
             <a:ext uri="{91240B29-F687-4f45-9708-019B960494DF}">
-              <a14:hiddenLine xmlns:a14="http://schemas.microsoft.com/office/drawing/2010/main" xmlns="" w="9525">
+              <a14:hiddenLine xmlns="" xmlns:a14="http://schemas.microsoft.com/office/drawing/2010/main" w="9525">
                 <a:solidFill>
                   <a:srgbClr val="000000"/>
                 </a:solidFill>
@@ -11275,14 +11275,14 @@
           </a:ln>
           <a:extLst>
             <a:ext uri="{909E8E84-426E-40dd-AFC4-6F175D3DCCD1}">
-              <a14:hiddenFill xmlns:a14="http://schemas.microsoft.com/office/drawing/2010/main" xmlns="">
+              <a14:hiddenFill xmlns="" xmlns:a14="http://schemas.microsoft.com/office/drawing/2010/main">
                 <a:solidFill>
                   <a:srgbClr val="FFFFFF"/>
                 </a:solidFill>
               </a14:hiddenFill>
             </a:ext>
             <a:ext uri="{91240B29-F687-4f45-9708-019B960494DF}">
-              <a14:hiddenLine xmlns:a14="http://schemas.microsoft.com/office/drawing/2010/main" xmlns="" w="9525">
+              <a14:hiddenLine xmlns="" xmlns:a14="http://schemas.microsoft.com/office/drawing/2010/main" w="9525">
                 <a:solidFill>
                   <a:srgbClr val="000000"/>
                 </a:solidFill>
@@ -12193,14 +12193,14 @@
           </a:ln>
           <a:extLst>
             <a:ext uri="{909E8E84-426E-40dd-AFC4-6F175D3DCCD1}">
-              <a14:hiddenFill xmlns:a14="http://schemas.microsoft.com/office/drawing/2010/main" xmlns="">
+              <a14:hiddenFill xmlns="" xmlns:a14="http://schemas.microsoft.com/office/drawing/2010/main">
                 <a:solidFill>
                   <a:srgbClr val="FFFFFF"/>
                 </a:solidFill>
               </a14:hiddenFill>
             </a:ext>
             <a:ext uri="{91240B29-F687-4f45-9708-019B960494DF}">
-              <a14:hiddenLine xmlns:a14="http://schemas.microsoft.com/office/drawing/2010/main" xmlns="" w="9525">
+              <a14:hiddenLine xmlns="" xmlns:a14="http://schemas.microsoft.com/office/drawing/2010/main" w="9525">
                 <a:solidFill>
                   <a:srgbClr val="000000"/>
                 </a:solidFill>

</xml_diff>